<commit_message>
Adding slide with scenarios for workshop
</commit_message>
<xml_diff>
--- a/OracleCloudNativeApplicationDev_MeetUp_januari2020.pptx
+++ b/OracleCloudNativeApplicationDev_MeetUp_januari2020.pptx
@@ -7,7 +7,7 @@
     <p:sldMasterId id="2147483695" r:id="rId6"/>
   </p:sldMasterIdLst>
   <p:notesMasterIdLst>
-    <p:notesMasterId r:id="rId29"/>
+    <p:notesMasterId r:id="rId30"/>
   </p:notesMasterIdLst>
   <p:sldIdLst>
     <p:sldId id="497" r:id="rId7"/>
@@ -32,21 +32,22 @@
     <p:sldId id="2921" r:id="rId26"/>
     <p:sldId id="2922" r:id="rId27"/>
     <p:sldId id="969" r:id="rId28"/>
+    <p:sldId id="2933" r:id="rId29"/>
   </p:sldIdLst>
   <p:sldSz cx="9144000" cy="5143500" type="screen16x9"/>
   <p:notesSz cx="6858000" cy="2543175"/>
   <p:embeddedFontLst>
     <p:embeddedFont>
       <p:font typeface="Calibri" panose="020F0502020204030204" pitchFamily="34" charset="0"/>
-      <p:regular r:id="rId30"/>
-      <p:bold r:id="rId31"/>
-      <p:italic r:id="rId32"/>
-      <p:boldItalic r:id="rId33"/>
+      <p:regular r:id="rId31"/>
+      <p:bold r:id="rId32"/>
+      <p:italic r:id="rId33"/>
+      <p:boldItalic r:id="rId34"/>
     </p:embeddedFont>
     <p:embeddedFont>
       <p:font typeface="Calibri Light" panose="020F0302020204030204" pitchFamily="34" charset="0"/>
-      <p:regular r:id="rId34"/>
-      <p:italic r:id="rId35"/>
+      <p:regular r:id="rId35"/>
+      <p:italic r:id="rId36"/>
     </p:embeddedFont>
   </p:embeddedFontLst>
   <p:defaultTextStyle>
@@ -34158,6 +34159,483 @@
     <p:extLst>
       <p:ext uri="{BB962C8B-B14F-4D97-AF65-F5344CB8AC3E}">
         <p14:creationId xmlns:p14="http://schemas.microsoft.com/office/powerpoint/2010/main" val="4149643114"/>
+      </p:ext>
+    </p:extLst>
+  </p:cSld>
+  <p:clrMapOvr>
+    <a:masterClrMapping/>
+  </p:clrMapOvr>
+</p:sld>
+</file>
+
+<file path=ppt/slides/slide23.xml><?xml version="1.0" encoding="utf-8"?>
+<p:sld xmlns:a="http://schemas.openxmlformats.org/drawingml/2006/main" xmlns:r="http://schemas.openxmlformats.org/officeDocument/2006/relationships" xmlns:p="http://schemas.openxmlformats.org/presentationml/2006/main">
+  <p:cSld>
+    <p:spTree>
+      <p:nvGrpSpPr>
+        <p:cNvPr id="1" name=""/>
+        <p:cNvGrpSpPr/>
+        <p:nvPr/>
+      </p:nvGrpSpPr>
+      <p:grpSpPr>
+        <a:xfrm>
+          <a:off x="0" y="0"/>
+          <a:ext cx="0" cy="0"/>
+          <a:chOff x="0" y="0"/>
+          <a:chExt cx="0" cy="0"/>
+        </a:xfrm>
+      </p:grpSpPr>
+      <p:sp>
+        <p:nvSpPr>
+          <p:cNvPr id="2" name="Title 1">
+            <a:extLst>
+              <a:ext uri="{FF2B5EF4-FFF2-40B4-BE49-F238E27FC236}">
+                <a16:creationId xmlns:a16="http://schemas.microsoft.com/office/drawing/2014/main" id="{4305BB2F-775A-4CB5-9047-42592A11A0F2}"/>
+              </a:ext>
+            </a:extLst>
+          </p:cNvPr>
+          <p:cNvSpPr>
+            <a:spLocks noGrp="1"/>
+          </p:cNvSpPr>
+          <p:nvPr>
+            <p:ph type="title"/>
+          </p:nvPr>
+        </p:nvSpPr>
+        <p:spPr/>
+        <p:txBody>
+          <a:bodyPr/>
+          <a:lstStyle/>
+          <a:p>
+            <a:r>
+              <a:rPr lang="nl-NL" dirty="0"/>
+              <a:t>Workshop </a:t>
+            </a:r>
+            <a:r>
+              <a:rPr lang="nl-NL" dirty="0" err="1"/>
+              <a:t>Scenarios</a:t>
+            </a:r>
+            <a:endParaRPr lang="en-NL" dirty="0"/>
+          </a:p>
+        </p:txBody>
+      </p:sp>
+      <p:sp>
+        <p:nvSpPr>
+          <p:cNvPr id="3" name="Content Placeholder 2">
+            <a:extLst>
+              <a:ext uri="{FF2B5EF4-FFF2-40B4-BE49-F238E27FC236}">
+                <a16:creationId xmlns:a16="http://schemas.microsoft.com/office/drawing/2014/main" id="{E6FD16A3-4DDF-4436-AEF5-996381A68CD2}"/>
+              </a:ext>
+            </a:extLst>
+          </p:cNvPr>
+          <p:cNvSpPr>
+            <a:spLocks noGrp="1"/>
+          </p:cNvSpPr>
+          <p:nvPr>
+            <p:ph idx="1"/>
+          </p:nvPr>
+        </p:nvSpPr>
+        <p:spPr/>
+        <p:txBody>
+          <a:bodyPr/>
+          <a:lstStyle/>
+          <a:p>
+            <a:r>
+              <a:rPr lang="nl-NL" dirty="0" err="1"/>
+              <a:t>Introducing</a:t>
+            </a:r>
+            <a:r>
+              <a:rPr lang="nl-NL" dirty="0"/>
+              <a:t> </a:t>
+            </a:r>
+            <a:r>
+              <a:rPr lang="nl-NL" dirty="0" err="1"/>
+              <a:t>serverless</a:t>
+            </a:r>
+            <a:r>
+              <a:rPr lang="nl-NL" dirty="0"/>
+              <a:t> </a:t>
+            </a:r>
+            <a:r>
+              <a:rPr lang="nl-NL" dirty="0" err="1"/>
+              <a:t>functions</a:t>
+            </a:r>
+            <a:r>
+              <a:rPr lang="nl-NL" dirty="0"/>
+              <a:t> </a:t>
+            </a:r>
+            <a:r>
+              <a:rPr lang="nl-NL" dirty="0" err="1"/>
+              <a:t>with</a:t>
+            </a:r>
+            <a:r>
+              <a:rPr lang="nl-NL" dirty="0"/>
+              <a:t> Project </a:t>
+            </a:r>
+            <a:r>
+              <a:rPr lang="nl-NL" dirty="0" err="1"/>
+              <a:t>Fn</a:t>
+            </a:r>
+            <a:endParaRPr lang="nl-NL" dirty="0"/>
+          </a:p>
+          <a:p>
+            <a:r>
+              <a:rPr lang="nl-NL" dirty="0" err="1"/>
+              <a:t>Functions</a:t>
+            </a:r>
+            <a:r>
+              <a:rPr lang="nl-NL" dirty="0"/>
+              <a:t> on Oracle Cloud </a:t>
+            </a:r>
+            <a:r>
+              <a:rPr lang="nl-NL" dirty="0" err="1"/>
+              <a:t>Infrastructure</a:t>
+            </a:r>
+            <a:endParaRPr lang="nl-NL" dirty="0"/>
+          </a:p>
+          <a:p>
+            <a:r>
+              <a:rPr lang="nl-NL" dirty="0"/>
+              <a:t>API Gateway on OCI</a:t>
+            </a:r>
+          </a:p>
+          <a:p>
+            <a:r>
+              <a:rPr lang="nl-NL" dirty="0" err="1"/>
+              <a:t>Functions</a:t>
+            </a:r>
+            <a:r>
+              <a:rPr lang="nl-NL" dirty="0"/>
+              <a:t>, Object Storage </a:t>
+            </a:r>
+            <a:r>
+              <a:rPr lang="nl-NL" dirty="0" err="1"/>
+              <a:t>and</a:t>
+            </a:r>
+            <a:r>
+              <a:rPr lang="nl-NL" dirty="0"/>
+              <a:t> API Gateway</a:t>
+            </a:r>
+          </a:p>
+          <a:p>
+            <a:r>
+              <a:rPr lang="nl-NL" dirty="0"/>
+              <a:t>OCI Event Streaming, API Gateway </a:t>
+            </a:r>
+            <a:br>
+              <a:rPr lang="nl-NL" dirty="0"/>
+            </a:br>
+            <a:r>
+              <a:rPr lang="nl-NL" dirty="0" err="1"/>
+              <a:t>and</a:t>
+            </a:r>
+            <a:r>
+              <a:rPr lang="nl-NL" dirty="0"/>
+              <a:t> </a:t>
+            </a:r>
+            <a:r>
+              <a:rPr lang="nl-NL" dirty="0" err="1"/>
+              <a:t>Functions</a:t>
+            </a:r>
+            <a:endParaRPr lang="en-NL" dirty="0"/>
+          </a:p>
+        </p:txBody>
+      </p:sp>
+      <p:sp>
+        <p:nvSpPr>
+          <p:cNvPr id="4" name="Footer Placeholder 3">
+            <a:extLst>
+              <a:ext uri="{FF2B5EF4-FFF2-40B4-BE49-F238E27FC236}">
+                <a16:creationId xmlns:a16="http://schemas.microsoft.com/office/drawing/2014/main" id="{2C5759EB-C5F7-4A61-9FC3-E3C937C5D86B}"/>
+              </a:ext>
+            </a:extLst>
+          </p:cNvPr>
+          <p:cNvSpPr>
+            <a:spLocks noGrp="1"/>
+          </p:cNvSpPr>
+          <p:nvPr>
+            <p:ph type="ftr" sz="quarter" idx="11"/>
+          </p:nvPr>
+        </p:nvSpPr>
+        <p:spPr/>
+        <p:txBody>
+          <a:bodyPr/>
+          <a:lstStyle/>
+          <a:p>
+            <a:r>
+              <a:rPr lang="en-US"/>
+              <a:t>Developer MeetUp: Oracle Cloud Native Application Development</a:t>
+            </a:r>
+            <a:endParaRPr lang="nl-NL"/>
+          </a:p>
+        </p:txBody>
+      </p:sp>
+      <p:pic>
+        <p:nvPicPr>
+          <p:cNvPr id="6" name="Snagit_SNG843">
+            <a:extLst>
+              <a:ext uri="{FF2B5EF4-FFF2-40B4-BE49-F238E27FC236}">
+                <a16:creationId xmlns:a16="http://schemas.microsoft.com/office/drawing/2014/main" id="{9685B017-CD00-4528-A7BE-D97ACD3B20C0}"/>
+              </a:ext>
+            </a:extLst>
+          </p:cNvPr>
+          <p:cNvPicPr>
+            <a:picLocks noChangeAspect="1"/>
+          </p:cNvPicPr>
+          <p:nvPr/>
+        </p:nvPicPr>
+        <p:blipFill>
+          <a:blip r:embed="rId2"/>
+          <a:stretch>
+            <a:fillRect/>
+          </a:stretch>
+        </p:blipFill>
+        <p:spPr>
+          <a:xfrm>
+            <a:off x="4780653" y="1174085"/>
+            <a:ext cx="1951963" cy="1832548"/>
+          </a:xfrm>
+          <a:prstGeom prst="rect">
+            <a:avLst/>
+          </a:prstGeom>
+        </p:spPr>
+      </p:pic>
+      <p:pic>
+        <p:nvPicPr>
+          <p:cNvPr id="8" name="Snagit_SNG84C">
+            <a:extLst>
+              <a:ext uri="{FF2B5EF4-FFF2-40B4-BE49-F238E27FC236}">
+                <a16:creationId xmlns:a16="http://schemas.microsoft.com/office/drawing/2014/main" id="{1C369E86-3248-40A4-B743-4733103FE3A8}"/>
+              </a:ext>
+            </a:extLst>
+          </p:cNvPr>
+          <p:cNvPicPr>
+            <a:picLocks noChangeAspect="1"/>
+          </p:cNvPicPr>
+          <p:nvPr/>
+        </p:nvPicPr>
+        <p:blipFill>
+          <a:blip r:embed="rId3"/>
+          <a:stretch>
+            <a:fillRect/>
+          </a:stretch>
+        </p:blipFill>
+        <p:spPr>
+          <a:xfrm>
+            <a:off x="7079421" y="1456466"/>
+            <a:ext cx="1865175" cy="1772578"/>
+          </a:xfrm>
+          <a:prstGeom prst="rect">
+            <a:avLst/>
+          </a:prstGeom>
+        </p:spPr>
+      </p:pic>
+      <p:pic>
+        <p:nvPicPr>
+          <p:cNvPr id="10" name="Snagit_SNG85B">
+            <a:extLst>
+              <a:ext uri="{FF2B5EF4-FFF2-40B4-BE49-F238E27FC236}">
+                <a16:creationId xmlns:a16="http://schemas.microsoft.com/office/drawing/2014/main" id="{F5C225DE-BFDA-47DA-AA4D-03206B728A5C}"/>
+              </a:ext>
+            </a:extLst>
+          </p:cNvPr>
+          <p:cNvPicPr>
+            <a:picLocks noChangeAspect="1"/>
+          </p:cNvPicPr>
+          <p:nvPr/>
+        </p:nvPicPr>
+        <p:blipFill>
+          <a:blip r:embed="rId4"/>
+          <a:stretch>
+            <a:fillRect/>
+          </a:stretch>
+        </p:blipFill>
+        <p:spPr>
+          <a:xfrm>
+            <a:off x="6096820" y="236977"/>
+            <a:ext cx="1476412" cy="1369973"/>
+          </a:xfrm>
+          <a:prstGeom prst="rect">
+            <a:avLst/>
+          </a:prstGeom>
+        </p:spPr>
+      </p:pic>
+      <p:pic>
+        <p:nvPicPr>
+          <p:cNvPr id="12" name="Snagit_SNG865">
+            <a:extLst>
+              <a:ext uri="{FF2B5EF4-FFF2-40B4-BE49-F238E27FC236}">
+                <a16:creationId xmlns:a16="http://schemas.microsoft.com/office/drawing/2014/main" id="{CEC636D4-953B-4944-8A88-D188D25774FA}"/>
+              </a:ext>
+            </a:extLst>
+          </p:cNvPr>
+          <p:cNvPicPr>
+            <a:picLocks noChangeAspect="1"/>
+          </p:cNvPicPr>
+          <p:nvPr/>
+        </p:nvPicPr>
+        <p:blipFill>
+          <a:blip r:embed="rId5"/>
+          <a:stretch>
+            <a:fillRect/>
+          </a:stretch>
+        </p:blipFill>
+        <p:spPr>
+          <a:xfrm>
+            <a:off x="3769562" y="3120306"/>
+            <a:ext cx="1845888" cy="1698217"/>
+          </a:xfrm>
+          <a:prstGeom prst="rect">
+            <a:avLst/>
+          </a:prstGeom>
+        </p:spPr>
+      </p:pic>
+      <p:pic>
+        <p:nvPicPr>
+          <p:cNvPr id="14" name="Snagit_SNG839">
+            <a:extLst>
+              <a:ext uri="{FF2B5EF4-FFF2-40B4-BE49-F238E27FC236}">
+                <a16:creationId xmlns:a16="http://schemas.microsoft.com/office/drawing/2014/main" id="{92E6BABB-89DD-412D-B51E-BEA3DF9DCB85}"/>
+              </a:ext>
+            </a:extLst>
+          </p:cNvPr>
+          <p:cNvPicPr>
+            <a:picLocks noChangeAspect="1"/>
+          </p:cNvPicPr>
+          <p:nvPr/>
+        </p:nvPicPr>
+        <p:blipFill>
+          <a:blip r:embed="rId6"/>
+          <a:stretch>
+            <a:fillRect/>
+          </a:stretch>
+        </p:blipFill>
+        <p:spPr>
+          <a:xfrm>
+            <a:off x="6103440" y="2883471"/>
+            <a:ext cx="1951963" cy="1840951"/>
+          </a:xfrm>
+          <a:prstGeom prst="rect">
+            <a:avLst/>
+          </a:prstGeom>
+        </p:spPr>
+      </p:pic>
+      <p:grpSp>
+        <p:nvGrpSpPr>
+          <p:cNvPr id="16" name="Group 15">
+            <a:extLst>
+              <a:ext uri="{FF2B5EF4-FFF2-40B4-BE49-F238E27FC236}">
+                <a16:creationId xmlns:a16="http://schemas.microsoft.com/office/drawing/2014/main" id="{8248445A-6F5C-4D7D-9686-F35AD85C6FCC}"/>
+              </a:ext>
+            </a:extLst>
+          </p:cNvPr>
+          <p:cNvGrpSpPr/>
+          <p:nvPr/>
+        </p:nvGrpSpPr>
+        <p:grpSpPr>
+          <a:xfrm>
+            <a:off x="601082" y="2696065"/>
+            <a:ext cx="2975705" cy="770712"/>
+            <a:chOff x="601082" y="2696065"/>
+            <a:chExt cx="2975705" cy="770712"/>
+          </a:xfrm>
+        </p:grpSpPr>
+        <p:sp>
+          <p:nvSpPr>
+            <p:cNvPr id="15" name="Rectangle 14">
+              <a:extLst>
+                <a:ext uri="{FF2B5EF4-FFF2-40B4-BE49-F238E27FC236}">
+                  <a16:creationId xmlns:a16="http://schemas.microsoft.com/office/drawing/2014/main" id="{BD1FB083-119D-425F-82E3-170DFDB8EA3F}"/>
+                </a:ext>
+              </a:extLst>
+            </p:cNvPr>
+            <p:cNvSpPr/>
+            <p:nvPr/>
+          </p:nvSpPr>
+          <p:spPr>
+            <a:xfrm>
+              <a:off x="601082" y="2696065"/>
+              <a:ext cx="2975705" cy="770712"/>
+            </a:xfrm>
+            <a:prstGeom prst="rect">
+              <a:avLst/>
+            </a:prstGeom>
+          </p:spPr>
+          <p:style>
+            <a:lnRef idx="1">
+              <a:schemeClr val="dk1"/>
+            </a:lnRef>
+            <a:fillRef idx="2">
+              <a:schemeClr val="dk1"/>
+            </a:fillRef>
+            <a:effectRef idx="1">
+              <a:schemeClr val="dk1"/>
+            </a:effectRef>
+            <a:fontRef idx="minor">
+              <a:schemeClr val="dk1"/>
+            </a:fontRef>
+          </p:style>
+          <p:txBody>
+            <a:bodyPr rtlCol="0" anchor="ctr"/>
+            <a:lstStyle/>
+            <a:p>
+              <a:pPr algn="ctr"/>
+              <a:endParaRPr lang="en-NL"/>
+            </a:p>
+          </p:txBody>
+        </p:sp>
+        <p:pic>
+          <p:nvPicPr>
+            <p:cNvPr id="7170" name="Picture 2" descr="Katacoda Logo">
+              <a:hlinkClick r:id="rId7"/>
+              <a:extLst>
+                <a:ext uri="{FF2B5EF4-FFF2-40B4-BE49-F238E27FC236}">
+                  <a16:creationId xmlns:a16="http://schemas.microsoft.com/office/drawing/2014/main" id="{1171DE84-A30C-475F-9129-A9F9FDBAE8E3}"/>
+                </a:ext>
+              </a:extLst>
+            </p:cNvPr>
+            <p:cNvPicPr>
+              <a:picLocks noChangeAspect="1" noChangeArrowheads="1"/>
+            </p:cNvPicPr>
+            <p:nvPr/>
+          </p:nvPicPr>
+          <p:blipFill>
+            <a:blip r:embed="rId8">
+              <a:extLst>
+                <a:ext uri="{28A0092B-C50C-407E-A947-70E740481C1C}">
+                  <a14:useLocalDpi xmlns:a14="http://schemas.microsoft.com/office/drawing/2010/main" val="0"/>
+                </a:ext>
+              </a:extLst>
+            </a:blip>
+            <a:srcRect/>
+            <a:stretch>
+              <a:fillRect/>
+            </a:stretch>
+          </p:blipFill>
+          <p:spPr bwMode="auto">
+            <a:xfrm>
+              <a:off x="738610" y="2795536"/>
+              <a:ext cx="2728333" cy="604875"/>
+            </a:xfrm>
+            <a:prstGeom prst="rect">
+              <a:avLst/>
+            </a:prstGeom>
+            <a:noFill/>
+            <a:extLst>
+              <a:ext uri="{909E8E84-426E-40DD-AFC4-6F175D3DCCD1}">
+                <a14:hiddenFill xmlns:a14="http://schemas.microsoft.com/office/drawing/2010/main">
+                  <a:solidFill>
+                    <a:srgbClr val="FFFFFF"/>
+                  </a:solidFill>
+                </a14:hiddenFill>
+              </a:ext>
+            </a:extLst>
+          </p:spPr>
+        </p:pic>
+      </p:grpSp>
+    </p:spTree>
+    <p:extLst>
+      <p:ext uri="{BB962C8B-B14F-4D97-AF65-F5344CB8AC3E}">
+        <p14:creationId xmlns:p14="http://schemas.microsoft.com/office/powerpoint/2010/main" val="2927748234"/>
       </p:ext>
     </p:extLst>
   </p:cSld>

</xml_diff>